<commit_message>
Changed the settings form to put all the instructions in a single text box instead of a textbox and a label.
</commit_message>
<xml_diff>
--- a/WRST_Caribou3/Help/WRST_CaribouDiagrams.pptx
+++ b/WRST_Caribou3/Help/WRST_CaribouDiagrams.pptx
@@ -7,6 +7,7 @@
   <p:sldIdLst>
     <p:sldId id="256" r:id="rId2"/>
     <p:sldId id="257" r:id="rId3"/>
+    <p:sldId id="258" r:id="rId4"/>
   </p:sldIdLst>
   <p:sldSz cx="12192000" cy="6858000"/>
   <p:notesSz cx="6858000" cy="9144000"/>
@@ -105,6 +106,11 @@
       </a:defRPr>
     </a:lvl9pPr>
   </p:defaultTextStyle>
+  <p:extLst>
+    <p:ext uri="{EFAFB233-063F-42B5-8137-9DF3F51BA10A}">
+      <p15:sldGuideLst xmlns:p15="http://schemas.microsoft.com/office/powerpoint/2012/main"/>
+    </p:ext>
+  </p:extLst>
 </p:presentation>
 </file>
 
@@ -239,7 +245,7 @@
           <a:p>
             <a:fld id="{C87FD794-7DE1-4EE6-AAE8-34B633E92047}" type="datetimeFigureOut">
               <a:rPr lang="en-US" smtClean="0"/>
-              <a:t>2019-11-25</a:t>
+              <a:t>2020-01-03</a:t>
             </a:fld>
             <a:endParaRPr lang="en-US"/>
           </a:p>
@@ -409,7 +415,7 @@
           <a:p>
             <a:fld id="{C87FD794-7DE1-4EE6-AAE8-34B633E92047}" type="datetimeFigureOut">
               <a:rPr lang="en-US" smtClean="0"/>
-              <a:t>2019-11-25</a:t>
+              <a:t>2020-01-03</a:t>
             </a:fld>
             <a:endParaRPr lang="en-US"/>
           </a:p>
@@ -589,7 +595,7 @@
           <a:p>
             <a:fld id="{C87FD794-7DE1-4EE6-AAE8-34B633E92047}" type="datetimeFigureOut">
               <a:rPr lang="en-US" smtClean="0"/>
-              <a:t>2019-11-25</a:t>
+              <a:t>2020-01-03</a:t>
             </a:fld>
             <a:endParaRPr lang="en-US"/>
           </a:p>
@@ -759,7 +765,7 @@
           <a:p>
             <a:fld id="{C87FD794-7DE1-4EE6-AAE8-34B633E92047}" type="datetimeFigureOut">
               <a:rPr lang="en-US" smtClean="0"/>
-              <a:t>2019-11-25</a:t>
+              <a:t>2020-01-03</a:t>
             </a:fld>
             <a:endParaRPr lang="en-US"/>
           </a:p>
@@ -1005,7 +1011,7 @@
           <a:p>
             <a:fld id="{C87FD794-7DE1-4EE6-AAE8-34B633E92047}" type="datetimeFigureOut">
               <a:rPr lang="en-US" smtClean="0"/>
-              <a:t>2019-11-25</a:t>
+              <a:t>2020-01-03</a:t>
             </a:fld>
             <a:endParaRPr lang="en-US"/>
           </a:p>
@@ -1237,7 +1243,7 @@
           <a:p>
             <a:fld id="{C87FD794-7DE1-4EE6-AAE8-34B633E92047}" type="datetimeFigureOut">
               <a:rPr lang="en-US" smtClean="0"/>
-              <a:t>2019-11-25</a:t>
+              <a:t>2020-01-03</a:t>
             </a:fld>
             <a:endParaRPr lang="en-US"/>
           </a:p>
@@ -1604,7 +1610,7 @@
           <a:p>
             <a:fld id="{C87FD794-7DE1-4EE6-AAE8-34B633E92047}" type="datetimeFigureOut">
               <a:rPr lang="en-US" smtClean="0"/>
-              <a:t>2019-11-25</a:t>
+              <a:t>2020-01-03</a:t>
             </a:fld>
             <a:endParaRPr lang="en-US"/>
           </a:p>
@@ -1722,7 +1728,7 @@
           <a:p>
             <a:fld id="{C87FD794-7DE1-4EE6-AAE8-34B633E92047}" type="datetimeFigureOut">
               <a:rPr lang="en-US" smtClean="0"/>
-              <a:t>2019-11-25</a:t>
+              <a:t>2020-01-03</a:t>
             </a:fld>
             <a:endParaRPr lang="en-US"/>
           </a:p>
@@ -1817,7 +1823,7 @@
           <a:p>
             <a:fld id="{C87FD794-7DE1-4EE6-AAE8-34B633E92047}" type="datetimeFigureOut">
               <a:rPr lang="en-US" smtClean="0"/>
-              <a:t>2019-11-25</a:t>
+              <a:t>2020-01-03</a:t>
             </a:fld>
             <a:endParaRPr lang="en-US"/>
           </a:p>
@@ -2094,7 +2100,7 @@
           <a:p>
             <a:fld id="{C87FD794-7DE1-4EE6-AAE8-34B633E92047}" type="datetimeFigureOut">
               <a:rPr lang="en-US" smtClean="0"/>
-              <a:t>2019-11-25</a:t>
+              <a:t>2020-01-03</a:t>
             </a:fld>
             <a:endParaRPr lang="en-US"/>
           </a:p>
@@ -2347,7 +2353,7 @@
           <a:p>
             <a:fld id="{C87FD794-7DE1-4EE6-AAE8-34B633E92047}" type="datetimeFigureOut">
               <a:rPr lang="en-US" smtClean="0"/>
-              <a:t>2019-11-25</a:t>
+              <a:t>2020-01-03</a:t>
             </a:fld>
             <a:endParaRPr lang="en-US"/>
           </a:p>
@@ -2560,7 +2566,7 @@
           <a:p>
             <a:fld id="{C87FD794-7DE1-4EE6-AAE8-34B633E92047}" type="datetimeFigureOut">
               <a:rPr lang="en-US" smtClean="0"/>
-              <a:t>2019-11-25</a:t>
+              <a:t>2020-01-03</a:t>
             </a:fld>
             <a:endParaRPr lang="en-US"/>
           </a:p>
@@ -4380,6 +4386,109 @@
 </p:sld>
 </file>
 
+<file path=ppt/slides/slide3.xml><?xml version="1.0" encoding="utf-8"?>
+<p:sld xmlns:a="http://schemas.openxmlformats.org/drawingml/2006/main" xmlns:r="http://schemas.openxmlformats.org/officeDocument/2006/relationships" xmlns:p="http://schemas.openxmlformats.org/presentationml/2006/main">
+  <p:cSld>
+    <p:spTree>
+      <p:nvGrpSpPr>
+        <p:cNvPr id="1" name=""/>
+        <p:cNvGrpSpPr/>
+        <p:nvPr/>
+      </p:nvGrpSpPr>
+      <p:grpSpPr>
+        <a:xfrm>
+          <a:off x="0" y="0"/>
+          <a:ext cx="0" cy="0"/>
+          <a:chOff x="0" y="0"/>
+          <a:chExt cx="0" cy="0"/>
+        </a:xfrm>
+      </p:grpSpPr>
+      <p:sp>
+        <p:nvSpPr>
+          <p:cNvPr id="4" name="TextBox 3"/>
+          <p:cNvSpPr txBox="1"/>
+          <p:nvPr/>
+        </p:nvSpPr>
+        <p:spPr>
+          <a:xfrm>
+            <a:off x="197381" y="116817"/>
+            <a:ext cx="1882247" cy="369332"/>
+          </a:xfrm>
+          <a:prstGeom prst="rect">
+            <a:avLst/>
+          </a:prstGeom>
+          <a:noFill/>
+        </p:spPr>
+        <p:txBody>
+          <a:bodyPr wrap="none" rtlCol="0">
+            <a:spAutoFit/>
+          </a:bodyPr>
+          <a:lstStyle/>
+          <a:p>
+            <a:r>
+              <a:rPr lang="en-US" smtClean="0"/>
+              <a:t>Chisana PE Survey</a:t>
+            </a:r>
+            <a:endParaRPr lang="en-US"/>
+          </a:p>
+        </p:txBody>
+      </p:sp>
+      <p:sp>
+        <p:nvSpPr>
+          <p:cNvPr id="5" name="TextBox 4"/>
+          <p:cNvSpPr txBox="1"/>
+          <p:nvPr/>
+        </p:nvSpPr>
+        <p:spPr>
+          <a:xfrm>
+            <a:off x="197381" y="486149"/>
+            <a:ext cx="10280763" cy="646331"/>
+          </a:xfrm>
+          <a:prstGeom prst="rect">
+            <a:avLst/>
+          </a:prstGeom>
+          <a:noFill/>
+        </p:spPr>
+        <p:txBody>
+          <a:bodyPr wrap="none" rtlCol="0">
+            <a:spAutoFit/>
+          </a:bodyPr>
+          <a:lstStyle/>
+          <a:p>
+            <a:r>
+              <a:rPr lang="en-US" sz="1200" smtClean="0"/>
+              <a:t>1. Survey area delineated by locating all radio collared animals</a:t>
+            </a:r>
+          </a:p>
+          <a:p>
+            <a:r>
+              <a:rPr lang="en-US" sz="1200" smtClean="0"/>
+              <a:t>2. Search for caribou groups without radiolocating. </a:t>
+            </a:r>
+            <a:r>
+              <a:rPr lang="en-US" sz="1200"/>
+              <a:t>Simultaneously, a fixed-wing aircraft locates radiocollared caribou to determine their locations and group sizes </a:t>
+            </a:r>
+            <a:endParaRPr lang="en-US" sz="1200" smtClean="0"/>
+          </a:p>
+          <a:p>
+            <a:endParaRPr lang="en-US" sz="1200"/>
+          </a:p>
+        </p:txBody>
+      </p:sp>
+    </p:spTree>
+    <p:extLst>
+      <p:ext uri="{BB962C8B-B14F-4D97-AF65-F5344CB8AC3E}">
+        <p14:creationId xmlns:p14="http://schemas.microsoft.com/office/powerpoint/2010/main" val="2636494159"/>
+      </p:ext>
+    </p:extLst>
+  </p:cSld>
+  <p:clrMapOvr>
+    <a:masterClrMapping/>
+  </p:clrMapOvr>
+</p:sld>
+</file>
+
 <file path=ppt/theme/theme1.xml><?xml version="1.0" encoding="utf-8"?>
 <a:theme xmlns:a="http://schemas.openxmlformats.org/drawingml/2006/main" name="Office Theme">
   <a:themeElements>

</xml_diff>

<commit_message>
Made ResultsForm .Show instead of .ShowDialog to allow switching between viewing QC queries and fixing data in the main form.
</commit_message>
<xml_diff>
--- a/WRST_Caribou3/Help/WRST_CaribouDiagrams.pptx
+++ b/WRST_Caribou3/Help/WRST_CaribouDiagrams.pptx
@@ -156,10 +156,9 @@
           </a:lstStyle>
           <a:p>
             <a:r>
-              <a:rPr lang="en-US" smtClean="0"/>
+              <a:rPr lang="en-US"/>
               <a:t>Click to edit Master title style</a:t>
             </a:r>
-            <a:endParaRPr lang="en-US"/>
           </a:p>
         </p:txBody>
       </p:sp>
@@ -221,10 +220,9 @@
           </a:lstStyle>
           <a:p>
             <a:r>
-              <a:rPr lang="en-US" smtClean="0"/>
+              <a:rPr lang="en-US"/>
               <a:t>Click to edit Master subtitle style</a:t>
             </a:r>
-            <a:endParaRPr lang="en-US"/>
           </a:p>
         </p:txBody>
       </p:sp>
@@ -245,7 +243,7 @@
           <a:p>
             <a:fld id="{C87FD794-7DE1-4EE6-AAE8-34B633E92047}" type="datetimeFigureOut">
               <a:rPr lang="en-US" smtClean="0"/>
-              <a:t>2020-01-03</a:t>
+              <a:t>2020-04-13</a:t>
             </a:fld>
             <a:endParaRPr lang="en-US"/>
           </a:p>
@@ -339,10 +337,9 @@
           <a:lstStyle/>
           <a:p>
             <a:r>
-              <a:rPr lang="en-US" smtClean="0"/>
+              <a:rPr lang="en-US"/>
               <a:t>Click to edit Master title style</a:t>
             </a:r>
-            <a:endParaRPr lang="en-US"/>
           </a:p>
         </p:txBody>
       </p:sp>
@@ -363,38 +360,37 @@
           <a:p>
             <a:pPr lvl="0"/>
             <a:r>
-              <a:rPr lang="en-US" smtClean="0"/>
+              <a:rPr lang="en-US"/>
               <a:t>Edit Master text styles</a:t>
             </a:r>
           </a:p>
           <a:p>
             <a:pPr lvl="1"/>
             <a:r>
-              <a:rPr lang="en-US" smtClean="0"/>
+              <a:rPr lang="en-US"/>
               <a:t>Second level</a:t>
             </a:r>
           </a:p>
           <a:p>
             <a:pPr lvl="2"/>
             <a:r>
-              <a:rPr lang="en-US" smtClean="0"/>
+              <a:rPr lang="en-US"/>
               <a:t>Third level</a:t>
             </a:r>
           </a:p>
           <a:p>
             <a:pPr lvl="3"/>
             <a:r>
-              <a:rPr lang="en-US" smtClean="0"/>
+              <a:rPr lang="en-US"/>
               <a:t>Fourth level</a:t>
             </a:r>
           </a:p>
           <a:p>
             <a:pPr lvl="4"/>
             <a:r>
-              <a:rPr lang="en-US" smtClean="0"/>
+              <a:rPr lang="en-US"/>
               <a:t>Fifth level</a:t>
             </a:r>
-            <a:endParaRPr lang="en-US"/>
           </a:p>
         </p:txBody>
       </p:sp>
@@ -415,7 +411,7 @@
           <a:p>
             <a:fld id="{C87FD794-7DE1-4EE6-AAE8-34B633E92047}" type="datetimeFigureOut">
               <a:rPr lang="en-US" smtClean="0"/>
-              <a:t>2020-01-03</a:t>
+              <a:t>2020-04-13</a:t>
             </a:fld>
             <a:endParaRPr lang="en-US"/>
           </a:p>
@@ -514,10 +510,9 @@
           <a:lstStyle/>
           <a:p>
             <a:r>
-              <a:rPr lang="en-US" smtClean="0"/>
+              <a:rPr lang="en-US"/>
               <a:t>Click to edit Master title style</a:t>
             </a:r>
-            <a:endParaRPr lang="en-US"/>
           </a:p>
         </p:txBody>
       </p:sp>
@@ -543,38 +538,37 @@
           <a:p>
             <a:pPr lvl="0"/>
             <a:r>
-              <a:rPr lang="en-US" smtClean="0"/>
+              <a:rPr lang="en-US"/>
               <a:t>Edit Master text styles</a:t>
             </a:r>
           </a:p>
           <a:p>
             <a:pPr lvl="1"/>
             <a:r>
-              <a:rPr lang="en-US" smtClean="0"/>
+              <a:rPr lang="en-US"/>
               <a:t>Second level</a:t>
             </a:r>
           </a:p>
           <a:p>
             <a:pPr lvl="2"/>
             <a:r>
-              <a:rPr lang="en-US" smtClean="0"/>
+              <a:rPr lang="en-US"/>
               <a:t>Third level</a:t>
             </a:r>
           </a:p>
           <a:p>
             <a:pPr lvl="3"/>
             <a:r>
-              <a:rPr lang="en-US" smtClean="0"/>
+              <a:rPr lang="en-US"/>
               <a:t>Fourth level</a:t>
             </a:r>
           </a:p>
           <a:p>
             <a:pPr lvl="4"/>
             <a:r>
-              <a:rPr lang="en-US" smtClean="0"/>
+              <a:rPr lang="en-US"/>
               <a:t>Fifth level</a:t>
             </a:r>
-            <a:endParaRPr lang="en-US"/>
           </a:p>
         </p:txBody>
       </p:sp>
@@ -595,7 +589,7 @@
           <a:p>
             <a:fld id="{C87FD794-7DE1-4EE6-AAE8-34B633E92047}" type="datetimeFigureOut">
               <a:rPr lang="en-US" smtClean="0"/>
-              <a:t>2020-01-03</a:t>
+              <a:t>2020-04-13</a:t>
             </a:fld>
             <a:endParaRPr lang="en-US"/>
           </a:p>
@@ -689,10 +683,9 @@
           <a:lstStyle/>
           <a:p>
             <a:r>
-              <a:rPr lang="en-US" smtClean="0"/>
+              <a:rPr lang="en-US"/>
               <a:t>Click to edit Master title style</a:t>
             </a:r>
-            <a:endParaRPr lang="en-US"/>
           </a:p>
         </p:txBody>
       </p:sp>
@@ -713,38 +706,37 @@
           <a:p>
             <a:pPr lvl="0"/>
             <a:r>
-              <a:rPr lang="en-US" smtClean="0"/>
+              <a:rPr lang="en-US"/>
               <a:t>Edit Master text styles</a:t>
             </a:r>
           </a:p>
           <a:p>
             <a:pPr lvl="1"/>
             <a:r>
-              <a:rPr lang="en-US" smtClean="0"/>
+              <a:rPr lang="en-US"/>
               <a:t>Second level</a:t>
             </a:r>
           </a:p>
           <a:p>
             <a:pPr lvl="2"/>
             <a:r>
-              <a:rPr lang="en-US" smtClean="0"/>
+              <a:rPr lang="en-US"/>
               <a:t>Third level</a:t>
             </a:r>
           </a:p>
           <a:p>
             <a:pPr lvl="3"/>
             <a:r>
-              <a:rPr lang="en-US" smtClean="0"/>
+              <a:rPr lang="en-US"/>
               <a:t>Fourth level</a:t>
             </a:r>
           </a:p>
           <a:p>
             <a:pPr lvl="4"/>
             <a:r>
-              <a:rPr lang="en-US" smtClean="0"/>
+              <a:rPr lang="en-US"/>
               <a:t>Fifth level</a:t>
             </a:r>
-            <a:endParaRPr lang="en-US"/>
           </a:p>
         </p:txBody>
       </p:sp>
@@ -765,7 +757,7 @@
           <a:p>
             <a:fld id="{C87FD794-7DE1-4EE6-AAE8-34B633E92047}" type="datetimeFigureOut">
               <a:rPr lang="en-US" smtClean="0"/>
-              <a:t>2020-01-03</a:t>
+              <a:t>2020-04-13</a:t>
             </a:fld>
             <a:endParaRPr lang="en-US"/>
           </a:p>
@@ -868,10 +860,9 @@
           </a:lstStyle>
           <a:p>
             <a:r>
-              <a:rPr lang="en-US" smtClean="0"/>
+              <a:rPr lang="en-US"/>
               <a:t>Click to edit Master title style</a:t>
             </a:r>
-            <a:endParaRPr lang="en-US"/>
           </a:p>
         </p:txBody>
       </p:sp>
@@ -988,7 +979,7 @@
           <a:p>
             <a:pPr lvl="0"/>
             <a:r>
-              <a:rPr lang="en-US" smtClean="0"/>
+              <a:rPr lang="en-US"/>
               <a:t>Edit Master text styles</a:t>
             </a:r>
           </a:p>
@@ -1011,7 +1002,7 @@
           <a:p>
             <a:fld id="{C87FD794-7DE1-4EE6-AAE8-34B633E92047}" type="datetimeFigureOut">
               <a:rPr lang="en-US" smtClean="0"/>
-              <a:t>2020-01-03</a:t>
+              <a:t>2020-04-13</a:t>
             </a:fld>
             <a:endParaRPr lang="en-US"/>
           </a:p>
@@ -1105,10 +1096,9 @@
           <a:lstStyle/>
           <a:p>
             <a:r>
-              <a:rPr lang="en-US" smtClean="0"/>
+              <a:rPr lang="en-US"/>
               <a:t>Click to edit Master title style</a:t>
             </a:r>
-            <a:endParaRPr lang="en-US"/>
           </a:p>
         </p:txBody>
       </p:sp>
@@ -1134,38 +1124,37 @@
           <a:p>
             <a:pPr lvl="0"/>
             <a:r>
-              <a:rPr lang="en-US" smtClean="0"/>
+              <a:rPr lang="en-US"/>
               <a:t>Edit Master text styles</a:t>
             </a:r>
           </a:p>
           <a:p>
             <a:pPr lvl="1"/>
             <a:r>
-              <a:rPr lang="en-US" smtClean="0"/>
+              <a:rPr lang="en-US"/>
               <a:t>Second level</a:t>
             </a:r>
           </a:p>
           <a:p>
             <a:pPr lvl="2"/>
             <a:r>
-              <a:rPr lang="en-US" smtClean="0"/>
+              <a:rPr lang="en-US"/>
               <a:t>Third level</a:t>
             </a:r>
           </a:p>
           <a:p>
             <a:pPr lvl="3"/>
             <a:r>
-              <a:rPr lang="en-US" smtClean="0"/>
+              <a:rPr lang="en-US"/>
               <a:t>Fourth level</a:t>
             </a:r>
           </a:p>
           <a:p>
             <a:pPr lvl="4"/>
             <a:r>
-              <a:rPr lang="en-US" smtClean="0"/>
+              <a:rPr lang="en-US"/>
               <a:t>Fifth level</a:t>
             </a:r>
-            <a:endParaRPr lang="en-US"/>
           </a:p>
         </p:txBody>
       </p:sp>
@@ -1191,38 +1180,37 @@
           <a:p>
             <a:pPr lvl="0"/>
             <a:r>
-              <a:rPr lang="en-US" smtClean="0"/>
+              <a:rPr lang="en-US"/>
               <a:t>Edit Master text styles</a:t>
             </a:r>
           </a:p>
           <a:p>
             <a:pPr lvl="1"/>
             <a:r>
-              <a:rPr lang="en-US" smtClean="0"/>
+              <a:rPr lang="en-US"/>
               <a:t>Second level</a:t>
             </a:r>
           </a:p>
           <a:p>
             <a:pPr lvl="2"/>
             <a:r>
-              <a:rPr lang="en-US" smtClean="0"/>
+              <a:rPr lang="en-US"/>
               <a:t>Third level</a:t>
             </a:r>
           </a:p>
           <a:p>
             <a:pPr lvl="3"/>
             <a:r>
-              <a:rPr lang="en-US" smtClean="0"/>
+              <a:rPr lang="en-US"/>
               <a:t>Fourth level</a:t>
             </a:r>
           </a:p>
           <a:p>
             <a:pPr lvl="4"/>
             <a:r>
-              <a:rPr lang="en-US" smtClean="0"/>
+              <a:rPr lang="en-US"/>
               <a:t>Fifth level</a:t>
             </a:r>
-            <a:endParaRPr lang="en-US"/>
           </a:p>
         </p:txBody>
       </p:sp>
@@ -1243,7 +1231,7 @@
           <a:p>
             <a:fld id="{C87FD794-7DE1-4EE6-AAE8-34B633E92047}" type="datetimeFigureOut">
               <a:rPr lang="en-US" smtClean="0"/>
-              <a:t>2020-01-03</a:t>
+              <a:t>2020-04-13</a:t>
             </a:fld>
             <a:endParaRPr lang="en-US"/>
           </a:p>
@@ -1342,10 +1330,9 @@
           <a:lstStyle/>
           <a:p>
             <a:r>
-              <a:rPr lang="en-US" smtClean="0"/>
+              <a:rPr lang="en-US"/>
               <a:t>Click to edit Master title style</a:t>
             </a:r>
-            <a:endParaRPr lang="en-US"/>
           </a:p>
         </p:txBody>
       </p:sp>
@@ -1408,7 +1395,7 @@
           <a:p>
             <a:pPr lvl="0"/>
             <a:r>
-              <a:rPr lang="en-US" smtClean="0"/>
+              <a:rPr lang="en-US"/>
               <a:t>Edit Master text styles</a:t>
             </a:r>
           </a:p>
@@ -1436,38 +1423,37 @@
           <a:p>
             <a:pPr lvl="0"/>
             <a:r>
-              <a:rPr lang="en-US" smtClean="0"/>
+              <a:rPr lang="en-US"/>
               <a:t>Edit Master text styles</a:t>
             </a:r>
           </a:p>
           <a:p>
             <a:pPr lvl="1"/>
             <a:r>
-              <a:rPr lang="en-US" smtClean="0"/>
+              <a:rPr lang="en-US"/>
               <a:t>Second level</a:t>
             </a:r>
           </a:p>
           <a:p>
             <a:pPr lvl="2"/>
             <a:r>
-              <a:rPr lang="en-US" smtClean="0"/>
+              <a:rPr lang="en-US"/>
               <a:t>Third level</a:t>
             </a:r>
           </a:p>
           <a:p>
             <a:pPr lvl="3"/>
             <a:r>
-              <a:rPr lang="en-US" smtClean="0"/>
+              <a:rPr lang="en-US"/>
               <a:t>Fourth level</a:t>
             </a:r>
           </a:p>
           <a:p>
             <a:pPr lvl="4"/>
             <a:r>
-              <a:rPr lang="en-US" smtClean="0"/>
+              <a:rPr lang="en-US"/>
               <a:t>Fifth level</a:t>
             </a:r>
-            <a:endParaRPr lang="en-US"/>
           </a:p>
         </p:txBody>
       </p:sp>
@@ -1530,7 +1516,7 @@
           <a:p>
             <a:pPr lvl="0"/>
             <a:r>
-              <a:rPr lang="en-US" smtClean="0"/>
+              <a:rPr lang="en-US"/>
               <a:t>Edit Master text styles</a:t>
             </a:r>
           </a:p>
@@ -1558,38 +1544,37 @@
           <a:p>
             <a:pPr lvl="0"/>
             <a:r>
-              <a:rPr lang="en-US" smtClean="0"/>
+              <a:rPr lang="en-US"/>
               <a:t>Edit Master text styles</a:t>
             </a:r>
           </a:p>
           <a:p>
             <a:pPr lvl="1"/>
             <a:r>
-              <a:rPr lang="en-US" smtClean="0"/>
+              <a:rPr lang="en-US"/>
               <a:t>Second level</a:t>
             </a:r>
           </a:p>
           <a:p>
             <a:pPr lvl="2"/>
             <a:r>
-              <a:rPr lang="en-US" smtClean="0"/>
+              <a:rPr lang="en-US"/>
               <a:t>Third level</a:t>
             </a:r>
           </a:p>
           <a:p>
             <a:pPr lvl="3"/>
             <a:r>
-              <a:rPr lang="en-US" smtClean="0"/>
+              <a:rPr lang="en-US"/>
               <a:t>Fourth level</a:t>
             </a:r>
           </a:p>
           <a:p>
             <a:pPr lvl="4"/>
             <a:r>
-              <a:rPr lang="en-US" smtClean="0"/>
+              <a:rPr lang="en-US"/>
               <a:t>Fifth level</a:t>
             </a:r>
-            <a:endParaRPr lang="en-US"/>
           </a:p>
         </p:txBody>
       </p:sp>
@@ -1610,7 +1595,7 @@
           <a:p>
             <a:fld id="{C87FD794-7DE1-4EE6-AAE8-34B633E92047}" type="datetimeFigureOut">
               <a:rPr lang="en-US" smtClean="0"/>
-              <a:t>2020-01-03</a:t>
+              <a:t>2020-04-13</a:t>
             </a:fld>
             <a:endParaRPr lang="en-US"/>
           </a:p>
@@ -1704,10 +1689,9 @@
           <a:lstStyle/>
           <a:p>
             <a:r>
-              <a:rPr lang="en-US" smtClean="0"/>
+              <a:rPr lang="en-US"/>
               <a:t>Click to edit Master title style</a:t>
             </a:r>
-            <a:endParaRPr lang="en-US"/>
           </a:p>
         </p:txBody>
       </p:sp>
@@ -1728,7 +1712,7 @@
           <a:p>
             <a:fld id="{C87FD794-7DE1-4EE6-AAE8-34B633E92047}" type="datetimeFigureOut">
               <a:rPr lang="en-US" smtClean="0"/>
-              <a:t>2020-01-03</a:t>
+              <a:t>2020-04-13</a:t>
             </a:fld>
             <a:endParaRPr lang="en-US"/>
           </a:p>
@@ -1823,7 +1807,7 @@
           <a:p>
             <a:fld id="{C87FD794-7DE1-4EE6-AAE8-34B633E92047}" type="datetimeFigureOut">
               <a:rPr lang="en-US" smtClean="0"/>
-              <a:t>2020-01-03</a:t>
+              <a:t>2020-04-13</a:t>
             </a:fld>
             <a:endParaRPr lang="en-US"/>
           </a:p>
@@ -1926,10 +1910,9 @@
           </a:lstStyle>
           <a:p>
             <a:r>
-              <a:rPr lang="en-US" smtClean="0"/>
+              <a:rPr lang="en-US"/>
               <a:t>Click to edit Master title style</a:t>
             </a:r>
-            <a:endParaRPr lang="en-US"/>
           </a:p>
         </p:txBody>
       </p:sp>
@@ -1983,38 +1966,37 @@
           <a:p>
             <a:pPr lvl="0"/>
             <a:r>
-              <a:rPr lang="en-US" smtClean="0"/>
+              <a:rPr lang="en-US"/>
               <a:t>Edit Master text styles</a:t>
             </a:r>
           </a:p>
           <a:p>
             <a:pPr lvl="1"/>
             <a:r>
-              <a:rPr lang="en-US" smtClean="0"/>
+              <a:rPr lang="en-US"/>
               <a:t>Second level</a:t>
             </a:r>
           </a:p>
           <a:p>
             <a:pPr lvl="2"/>
             <a:r>
-              <a:rPr lang="en-US" smtClean="0"/>
+              <a:rPr lang="en-US"/>
               <a:t>Third level</a:t>
             </a:r>
           </a:p>
           <a:p>
             <a:pPr lvl="3"/>
             <a:r>
-              <a:rPr lang="en-US" smtClean="0"/>
+              <a:rPr lang="en-US"/>
               <a:t>Fourth level</a:t>
             </a:r>
           </a:p>
           <a:p>
             <a:pPr lvl="4"/>
             <a:r>
-              <a:rPr lang="en-US" smtClean="0"/>
+              <a:rPr lang="en-US"/>
               <a:t>Fifth level</a:t>
             </a:r>
-            <a:endParaRPr lang="en-US"/>
           </a:p>
         </p:txBody>
       </p:sp>
@@ -2077,7 +2059,7 @@
           <a:p>
             <a:pPr lvl="0"/>
             <a:r>
-              <a:rPr lang="en-US" smtClean="0"/>
+              <a:rPr lang="en-US"/>
               <a:t>Edit Master text styles</a:t>
             </a:r>
           </a:p>
@@ -2100,7 +2082,7 @@
           <a:p>
             <a:fld id="{C87FD794-7DE1-4EE6-AAE8-34B633E92047}" type="datetimeFigureOut">
               <a:rPr lang="en-US" smtClean="0"/>
-              <a:t>2020-01-03</a:t>
+              <a:t>2020-04-13</a:t>
             </a:fld>
             <a:endParaRPr lang="en-US"/>
           </a:p>
@@ -2203,10 +2185,9 @@
           </a:lstStyle>
           <a:p>
             <a:r>
-              <a:rPr lang="en-US" smtClean="0"/>
+              <a:rPr lang="en-US"/>
               <a:t>Click to edit Master title style</a:t>
             </a:r>
-            <a:endParaRPr lang="en-US"/>
           </a:p>
         </p:txBody>
       </p:sp>
@@ -2330,7 +2311,7 @@
           <a:p>
             <a:pPr lvl="0"/>
             <a:r>
-              <a:rPr lang="en-US" smtClean="0"/>
+              <a:rPr lang="en-US"/>
               <a:t>Edit Master text styles</a:t>
             </a:r>
           </a:p>
@@ -2353,7 +2334,7 @@
           <a:p>
             <a:fld id="{C87FD794-7DE1-4EE6-AAE8-34B633E92047}" type="datetimeFigureOut">
               <a:rPr lang="en-US" smtClean="0"/>
-              <a:t>2020-01-03</a:t>
+              <a:t>2020-04-13</a:t>
             </a:fld>
             <a:endParaRPr lang="en-US"/>
           </a:p>
@@ -2462,10 +2443,9 @@
           <a:lstStyle/>
           <a:p>
             <a:r>
-              <a:rPr lang="en-US" smtClean="0"/>
+              <a:rPr lang="en-US"/>
               <a:t>Click to edit Master title style</a:t>
             </a:r>
-            <a:endParaRPr lang="en-US"/>
           </a:p>
         </p:txBody>
       </p:sp>
@@ -2496,38 +2476,37 @@
           <a:p>
             <a:pPr lvl="0"/>
             <a:r>
-              <a:rPr lang="en-US" smtClean="0"/>
+              <a:rPr lang="en-US"/>
               <a:t>Edit Master text styles</a:t>
             </a:r>
           </a:p>
           <a:p>
             <a:pPr lvl="1"/>
             <a:r>
-              <a:rPr lang="en-US" smtClean="0"/>
+              <a:rPr lang="en-US"/>
               <a:t>Second level</a:t>
             </a:r>
           </a:p>
           <a:p>
             <a:pPr lvl="2"/>
             <a:r>
-              <a:rPr lang="en-US" smtClean="0"/>
+              <a:rPr lang="en-US"/>
               <a:t>Third level</a:t>
             </a:r>
           </a:p>
           <a:p>
             <a:pPr lvl="3"/>
             <a:r>
-              <a:rPr lang="en-US" smtClean="0"/>
+              <a:rPr lang="en-US"/>
               <a:t>Fourth level</a:t>
             </a:r>
           </a:p>
           <a:p>
             <a:pPr lvl="4"/>
             <a:r>
-              <a:rPr lang="en-US" smtClean="0"/>
+              <a:rPr lang="en-US"/>
               <a:t>Fifth level</a:t>
             </a:r>
-            <a:endParaRPr lang="en-US"/>
           </a:p>
         </p:txBody>
       </p:sp>
@@ -2566,7 +2545,7 @@
           <a:p>
             <a:fld id="{C87FD794-7DE1-4EE6-AAE8-34B633E92047}" type="datetimeFigureOut">
               <a:rPr lang="en-US" smtClean="0"/>
-              <a:t>2020-01-03</a:t>
+              <a:t>2020-04-13</a:t>
             </a:fld>
             <a:endParaRPr lang="en-US"/>
           </a:p>
@@ -2981,6 +2960,7 @@
         </p:nvPicPr>
         <p:blipFill>
           <a:blip r:embed="rId2">
+            <a:alphaModFix amt="5000"/>
             <a:extLst>
               <a:ext uri="{28A0092B-C50C-407E-A947-70E740481C1C}">
                 <a14:useLocalDpi xmlns:a14="http://schemas.microsoft.com/office/drawing/2010/main" val="0"/>
@@ -3419,10 +3399,9 @@
           <a:lstStyle/>
           <a:p>
             <a:r>
-              <a:rPr lang="en-US" smtClean="0"/>
+              <a:rPr lang="en-US"/>
               <a:t>GPS/VHF collar</a:t>
             </a:r>
-            <a:endParaRPr lang="en-US"/>
           </a:p>
         </p:txBody>
       </p:sp>
@@ -3648,7 +3627,7 @@
         </p:nvSpPr>
         <p:spPr>
           <a:xfrm>
-            <a:off x="226963" y="1983779"/>
+            <a:off x="226963" y="2459445"/>
             <a:ext cx="1388522" cy="400110"/>
           </a:xfrm>
           <a:prstGeom prst="rect">
@@ -3662,17 +3641,139 @@
           </a:bodyPr>
           <a:lstStyle/>
           <a:p>
-            <a:r>
-              <a:rPr lang="en-US" sz="1000" smtClean="0"/>
+            <a:pPr algn="ctr"/>
+            <a:r>
+              <a:rPr lang="en-US" sz="1000"/>
               <a:t>NPS Animal Movement</a:t>
             </a:r>
           </a:p>
           <a:p>
-            <a:r>
-              <a:rPr lang="en-US" sz="1000" smtClean="0"/>
+            <a:pPr algn="ctr"/>
+            <a:r>
+              <a:rPr lang="en-US" sz="1000"/>
               <a:t>database</a:t>
             </a:r>
-            <a:endParaRPr lang="en-US" sz="1000"/>
+          </a:p>
+        </p:txBody>
+      </p:sp>
+      <p:cxnSp>
+        <p:nvCxnSpPr>
+          <p:cNvPr id="30" name="Straight Arrow Connector 29"/>
+          <p:cNvCxnSpPr>
+            <a:stCxn id="8" idx="0"/>
+          </p:cNvCxnSpPr>
+          <p:nvPr/>
+        </p:nvCxnSpPr>
+        <p:spPr>
+          <a:xfrm flipV="1">
+            <a:off x="1753407" y="4930651"/>
+            <a:ext cx="504175" cy="302533"/>
+          </a:xfrm>
+          <a:prstGeom prst="straightConnector1">
+            <a:avLst/>
+          </a:prstGeom>
+          <a:ln>
+            <a:solidFill>
+              <a:schemeClr val="tx1"/>
+            </a:solidFill>
+            <a:tailEnd type="triangle"/>
+          </a:ln>
+        </p:spPr>
+        <p:style>
+          <a:lnRef idx="1">
+            <a:schemeClr val="accent1"/>
+          </a:lnRef>
+          <a:fillRef idx="0">
+            <a:schemeClr val="accent1"/>
+          </a:fillRef>
+          <a:effectRef idx="0">
+            <a:schemeClr val="accent1"/>
+          </a:effectRef>
+          <a:fontRef idx="minor">
+            <a:schemeClr val="tx1"/>
+          </a:fontRef>
+        </p:style>
+      </p:cxnSp>
+      <p:sp>
+        <p:nvSpPr>
+          <p:cNvPr id="36" name="Flowchart: Magnetic Disk 35"/>
+          <p:cNvSpPr/>
+          <p:nvPr/>
+        </p:nvSpPr>
+        <p:spPr>
+          <a:xfrm>
+            <a:off x="5588649" y="4984637"/>
+            <a:ext cx="449257" cy="448492"/>
+          </a:xfrm>
+          <a:prstGeom prst="flowChartMagneticDisk">
+            <a:avLst/>
+          </a:prstGeom>
+          <a:solidFill>
+            <a:schemeClr val="bg1">
+              <a:lumMod val="75000"/>
+            </a:schemeClr>
+          </a:solidFill>
+          <a:ln>
+            <a:solidFill>
+              <a:schemeClr val="tx1"/>
+            </a:solidFill>
+          </a:ln>
+        </p:spPr>
+        <p:style>
+          <a:lnRef idx="2">
+            <a:schemeClr val="accent1">
+              <a:shade val="50000"/>
+            </a:schemeClr>
+          </a:lnRef>
+          <a:fillRef idx="1">
+            <a:schemeClr val="accent1"/>
+          </a:fillRef>
+          <a:effectRef idx="0">
+            <a:schemeClr val="accent1"/>
+          </a:effectRef>
+          <a:fontRef idx="minor">
+            <a:schemeClr val="lt1"/>
+          </a:fontRef>
+        </p:style>
+        <p:txBody>
+          <a:bodyPr rtlCol="0" anchor="ctr"/>
+          <a:lstStyle/>
+          <a:p>
+            <a:pPr algn="ctr"/>
+            <a:endParaRPr lang="en-US" sz="1000">
+              <a:solidFill>
+                <a:schemeClr val="tx1"/>
+              </a:solidFill>
+            </a:endParaRPr>
+          </a:p>
+        </p:txBody>
+      </p:sp>
+      <p:sp>
+        <p:nvSpPr>
+          <p:cNvPr id="37" name="TextBox 36"/>
+          <p:cNvSpPr txBox="1"/>
+          <p:nvPr/>
+        </p:nvSpPr>
+        <p:spPr>
+          <a:xfrm>
+            <a:off x="4981158" y="5140372"/>
+            <a:ext cx="1664238" cy="246221"/>
+          </a:xfrm>
+          <a:prstGeom prst="rect">
+            <a:avLst/>
+          </a:prstGeom>
+          <a:noFill/>
+        </p:spPr>
+        <p:txBody>
+          <a:bodyPr wrap="none" rtlCol="0">
+            <a:spAutoFit/>
+          </a:bodyPr>
+          <a:lstStyle/>
+          <a:p>
+            <a:r>
+              <a:rPr lang="en-US" sz="1000"/>
+              <a:t>NPS WRST Caribou database</a:t>
+            </a:r>
           </a:p>
         </p:txBody>
       </p:sp>
@@ -3685,13 +3786,13 @@
           <p:nvPr>
             <p:extLst>
               <p:ext uri="{D42A27DB-BD31-4B8C-83A1-F6EECF244321}">
-                <p14:modId xmlns:p14="http://schemas.microsoft.com/office/powerpoint/2010/main" val="527898736"/>
+                <p14:modId xmlns:p14="http://schemas.microsoft.com/office/powerpoint/2010/main" val="3486958154"/>
               </p:ext>
             </p:extLst>
           </p:nvPr>
         </p:nvGraphicFramePr>
         <p:xfrm>
-          <a:off x="2706319" y="1019698"/>
+          <a:off x="3169408" y="5520877"/>
           <a:ext cx="3341785" cy="594780"/>
         </p:xfrm>
         <a:graphic>
@@ -3751,10 +3852,9 @@
                     <a:lstStyle/>
                     <a:p>
                       <a:r>
-                        <a:rPr lang="en-US" sz="800" smtClean="0"/>
+                        <a:rPr lang="en-US" sz="800"/>
                         <a:t>Group #</a:t>
                       </a:r>
-                      <a:endParaRPr lang="en-US" sz="800"/>
                     </a:p>
                   </a:txBody>
                   <a:tcPr/>
@@ -3765,10 +3865,9 @@
                     <a:lstStyle/>
                     <a:p>
                       <a:r>
-                        <a:rPr lang="en-US" sz="800" smtClean="0"/>
+                        <a:rPr lang="en-US" sz="800"/>
                         <a:t>Lat</a:t>
                       </a:r>
-                      <a:endParaRPr lang="en-US" sz="800"/>
                     </a:p>
                   </a:txBody>
                   <a:tcPr/>
@@ -3779,10 +3878,9 @@
                     <a:lstStyle/>
                     <a:p>
                       <a:r>
-                        <a:rPr lang="en-US" sz="800" smtClean="0"/>
+                        <a:rPr lang="en-US" sz="800"/>
                         <a:t>Lon</a:t>
                       </a:r>
-                      <a:endParaRPr lang="en-US" sz="800"/>
                     </a:p>
                   </a:txBody>
                   <a:tcPr/>
@@ -3793,10 +3891,9 @@
                     <a:lstStyle/>
                     <a:p>
                       <a:r>
-                        <a:rPr lang="en-US" sz="800" smtClean="0"/>
+                        <a:rPr lang="en-US" sz="800"/>
                         <a:t>Bull</a:t>
                       </a:r>
-                      <a:endParaRPr lang="en-US" sz="800"/>
                     </a:p>
                   </a:txBody>
                   <a:tcPr/>
@@ -3807,10 +3904,9 @@
                     <a:lstStyle/>
                     <a:p>
                       <a:r>
-                        <a:rPr lang="en-US" sz="800" smtClean="0"/>
+                        <a:rPr lang="en-US" sz="800"/>
                         <a:t>Cow</a:t>
                       </a:r>
-                      <a:endParaRPr lang="en-US" sz="800"/>
                     </a:p>
                   </a:txBody>
                   <a:tcPr/>
@@ -3821,10 +3917,9 @@
                     <a:lstStyle/>
                     <a:p>
                       <a:r>
-                        <a:rPr lang="en-US" sz="800" smtClean="0"/>
+                        <a:rPr lang="en-US" sz="800"/>
                         <a:t>Calf</a:t>
                       </a:r>
-                      <a:endParaRPr lang="en-US" sz="800"/>
                     </a:p>
                   </a:txBody>
                   <a:tcPr/>
@@ -3842,10 +3937,9 @@
                     <a:lstStyle/>
                     <a:p>
                       <a:r>
-                        <a:rPr lang="en-US" sz="800" smtClean="0"/>
+                        <a:rPr lang="en-US" sz="800"/>
                         <a:t>1</a:t>
                       </a:r>
-                      <a:endParaRPr lang="en-US" sz="800"/>
                     </a:p>
                   </a:txBody>
                   <a:tcPr/>
@@ -3856,10 +3950,9 @@
                     <a:lstStyle/>
                     <a:p>
                       <a:r>
-                        <a:rPr lang="en-US" sz="800" smtClean="0"/>
+                        <a:rPr lang="en-US" sz="800"/>
                         <a:t>62.467633</a:t>
                       </a:r>
-                      <a:endParaRPr lang="en-US" sz="800"/>
                     </a:p>
                   </a:txBody>
                   <a:tcPr/>
@@ -3870,10 +3963,9 @@
                     <a:lstStyle/>
                     <a:p>
                       <a:r>
-                        <a:rPr lang="en-US" sz="800" smtClean="0"/>
+                        <a:rPr lang="en-US" sz="800"/>
                         <a:t>-144.2366</a:t>
                       </a:r>
-                      <a:endParaRPr lang="en-US" sz="800"/>
                     </a:p>
                   </a:txBody>
                   <a:tcPr/>
@@ -3884,10 +3976,9 @@
                     <a:lstStyle/>
                     <a:p>
                       <a:r>
-                        <a:rPr lang="en-US" sz="800" smtClean="0"/>
+                        <a:rPr lang="en-US" sz="800"/>
                         <a:t>3</a:t>
                       </a:r>
-                      <a:endParaRPr lang="en-US" sz="800"/>
                     </a:p>
                   </a:txBody>
                   <a:tcPr/>
@@ -3898,10 +3989,9 @@
                     <a:lstStyle/>
                     <a:p>
                       <a:r>
-                        <a:rPr lang="en-US" sz="800" smtClean="0"/>
+                        <a:rPr lang="en-US" sz="800"/>
                         <a:t>0</a:t>
                       </a:r>
-                      <a:endParaRPr lang="en-US" sz="800"/>
                     </a:p>
                   </a:txBody>
                   <a:tcPr/>
@@ -3912,10 +4002,9 @@
                     <a:lstStyle/>
                     <a:p>
                       <a:r>
-                        <a:rPr lang="en-US" sz="800" smtClean="0"/>
+                        <a:rPr lang="en-US" sz="800"/>
                         <a:t>1</a:t>
                       </a:r>
-                      <a:endParaRPr lang="en-US" sz="800"/>
                     </a:p>
                   </a:txBody>
                   <a:tcPr/>
@@ -3930,108 +4019,22 @@
           </a:graphicData>
         </a:graphic>
       </p:graphicFrame>
-      <p:cxnSp>
-        <p:nvCxnSpPr>
-          <p:cNvPr id="30" name="Straight Arrow Connector 29"/>
-          <p:cNvCxnSpPr>
-            <a:stCxn id="8" idx="0"/>
-          </p:cNvCxnSpPr>
-          <p:nvPr/>
-        </p:nvCxnSpPr>
-        <p:spPr>
-          <a:xfrm flipV="1">
-            <a:off x="1753407" y="4930651"/>
-            <a:ext cx="504175" cy="302533"/>
-          </a:xfrm>
-          <a:prstGeom prst="straightConnector1">
-            <a:avLst/>
-          </a:prstGeom>
-          <a:ln>
-            <a:solidFill>
-              <a:schemeClr val="tx1"/>
-            </a:solidFill>
-            <a:tailEnd type="triangle"/>
-          </a:ln>
-        </p:spPr>
-        <p:style>
-          <a:lnRef idx="1">
-            <a:schemeClr val="accent1"/>
-          </a:lnRef>
-          <a:fillRef idx="0">
-            <a:schemeClr val="accent1"/>
-          </a:fillRef>
-          <a:effectRef idx="0">
-            <a:schemeClr val="accent1"/>
-          </a:effectRef>
-          <a:fontRef idx="minor">
-            <a:schemeClr val="tx1"/>
-          </a:fontRef>
-        </p:style>
-      </p:cxnSp>
-      <p:sp>
-        <p:nvSpPr>
-          <p:cNvPr id="36" name="Flowchart: Magnetic Disk 35"/>
-          <p:cNvSpPr/>
-          <p:nvPr/>
-        </p:nvSpPr>
-        <p:spPr>
-          <a:xfrm>
-            <a:off x="4110283" y="503873"/>
-            <a:ext cx="449257" cy="448492"/>
-          </a:xfrm>
-          <a:prstGeom prst="flowChartMagneticDisk">
-            <a:avLst/>
-          </a:prstGeom>
-          <a:solidFill>
-            <a:schemeClr val="bg1">
-              <a:lumMod val="75000"/>
-            </a:schemeClr>
-          </a:solidFill>
-          <a:ln>
-            <a:solidFill>
-              <a:schemeClr val="tx1"/>
-            </a:solidFill>
-          </a:ln>
-        </p:spPr>
-        <p:style>
-          <a:lnRef idx="2">
-            <a:schemeClr val="accent1">
-              <a:shade val="50000"/>
-            </a:schemeClr>
-          </a:lnRef>
-          <a:fillRef idx="1">
-            <a:schemeClr val="accent1"/>
-          </a:fillRef>
-          <a:effectRef idx="0">
-            <a:schemeClr val="accent1"/>
-          </a:effectRef>
-          <a:fontRef idx="minor">
-            <a:schemeClr val="lt1"/>
-          </a:fontRef>
-        </p:style>
-        <p:txBody>
-          <a:bodyPr rtlCol="0" anchor="ctr"/>
-          <a:lstStyle/>
-          <a:p>
-            <a:pPr algn="ctr"/>
-            <a:endParaRPr lang="en-US" sz="1000">
-              <a:solidFill>
-                <a:schemeClr val="tx1"/>
-              </a:solidFill>
-            </a:endParaRPr>
-          </a:p>
-        </p:txBody>
-      </p:sp>
-      <p:sp>
-        <p:nvSpPr>
-          <p:cNvPr id="37" name="TextBox 36"/>
+      <p:sp>
+        <p:nvSpPr>
+          <p:cNvPr id="2" name="TextBox 1">
+            <a:extLst>
+              <a:ext uri="{FF2B5EF4-FFF2-40B4-BE49-F238E27FC236}">
+                <a16:creationId xmlns:a16="http://schemas.microsoft.com/office/drawing/2014/main" id="{49BA9C35-2BA0-4A87-9017-D4881709341B}"/>
+              </a:ext>
+            </a:extLst>
+          </p:cNvPr>
           <p:cNvSpPr txBox="1"/>
           <p:nvPr/>
         </p:nvSpPr>
         <p:spPr>
           <a:xfrm>
-            <a:off x="3685951" y="211550"/>
-            <a:ext cx="1664238" cy="246221"/>
+            <a:off x="4877945" y="1701702"/>
+            <a:ext cx="1522853" cy="461665"/>
           </a:xfrm>
           <a:prstGeom prst="rect">
             <a:avLst/>
@@ -4045,10 +4048,109 @@
           <a:lstStyle/>
           <a:p>
             <a:r>
-              <a:rPr lang="en-US" sz="1000" smtClean="0"/>
-              <a:t>NPS WRST Caribou database</a:t>
-            </a:r>
-            <a:endParaRPr lang="en-US" sz="1000"/>
+              <a:rPr lang="en-US" sz="1200"/>
+              <a:t>Aerial survey detects </a:t>
+            </a:r>
+          </a:p>
+          <a:p>
+            <a:r>
+              <a:rPr lang="en-US" sz="1200"/>
+              <a:t>an animal group</a:t>
+            </a:r>
+          </a:p>
+        </p:txBody>
+      </p:sp>
+      <p:sp>
+        <p:nvSpPr>
+          <p:cNvPr id="24" name="TextBox 23">
+            <a:extLst>
+              <a:ext uri="{FF2B5EF4-FFF2-40B4-BE49-F238E27FC236}">
+                <a16:creationId xmlns:a16="http://schemas.microsoft.com/office/drawing/2014/main" id="{04364A9F-6D03-4188-8DB8-7A7FBBDB7137}"/>
+              </a:ext>
+            </a:extLst>
+          </p:cNvPr>
+          <p:cNvSpPr txBox="1"/>
+          <p:nvPr/>
+        </p:nvSpPr>
+        <p:spPr>
+          <a:xfrm>
+            <a:off x="1617121" y="1040354"/>
+            <a:ext cx="2515112" cy="646331"/>
+          </a:xfrm>
+          <a:prstGeom prst="rect">
+            <a:avLst/>
+          </a:prstGeom>
+          <a:noFill/>
+        </p:spPr>
+        <p:txBody>
+          <a:bodyPr wrap="none" rtlCol="0">
+            <a:spAutoFit/>
+          </a:bodyPr>
+          <a:lstStyle/>
+          <a:p>
+            <a:r>
+              <a:rPr lang="en-US" sz="1200"/>
+              <a:t>VHF collars help locate animal groups</a:t>
+            </a:r>
+          </a:p>
+          <a:p>
+            <a:r>
+              <a:rPr lang="en-US" sz="1200"/>
+              <a:t>GPS collar ‘pings’ captured by</a:t>
+            </a:r>
+          </a:p>
+          <a:p>
+            <a:r>
+              <a:rPr lang="en-US" sz="1200"/>
+              <a:t>Animal_Movement database</a:t>
+            </a:r>
+          </a:p>
+        </p:txBody>
+      </p:sp>
+      <p:sp>
+        <p:nvSpPr>
+          <p:cNvPr id="29" name="TextBox 28">
+            <a:extLst>
+              <a:ext uri="{FF2B5EF4-FFF2-40B4-BE49-F238E27FC236}">
+                <a16:creationId xmlns:a16="http://schemas.microsoft.com/office/drawing/2014/main" id="{E2AFB181-55C6-441B-BBB3-59E5D7A9CE88}"/>
+              </a:ext>
+            </a:extLst>
+          </p:cNvPr>
+          <p:cNvSpPr txBox="1"/>
+          <p:nvPr/>
+        </p:nvSpPr>
+        <p:spPr>
+          <a:xfrm>
+            <a:off x="4724292" y="3984140"/>
+            <a:ext cx="2346733" cy="646331"/>
+          </a:xfrm>
+          <a:prstGeom prst="rect">
+            <a:avLst/>
+          </a:prstGeom>
+          <a:noFill/>
+        </p:spPr>
+        <p:txBody>
+          <a:bodyPr wrap="none" rtlCol="0">
+            <a:spAutoFit/>
+          </a:bodyPr>
+          <a:lstStyle/>
+          <a:p>
+            <a:r>
+              <a:rPr lang="en-US" sz="1200"/>
+              <a:t>Caribou group attributes recorded </a:t>
+            </a:r>
+          </a:p>
+          <a:p>
+            <a:r>
+              <a:rPr lang="en-US" sz="1200"/>
+              <a:t>and captured in WRST_Caribou </a:t>
+            </a:r>
+          </a:p>
+          <a:p>
+            <a:r>
+              <a:rPr lang="en-US" sz="1200"/>
+              <a:t>database</a:t>
+            </a:r>
           </a:p>
         </p:txBody>
       </p:sp>
@@ -4159,16 +4261,15 @@
           <a:lstStyle/>
           <a:p>
             <a:r>
-              <a:rPr lang="en-US" sz="1000" smtClean="0"/>
+              <a:rPr lang="en-US" sz="1000"/>
               <a:t>NPS Animal Movement</a:t>
             </a:r>
           </a:p>
           <a:p>
             <a:r>
-              <a:rPr lang="en-US" sz="1000" smtClean="0"/>
+              <a:rPr lang="en-US" sz="1000"/>
               <a:t>database</a:t>
             </a:r>
-            <a:endParaRPr lang="en-US" sz="1000"/>
           </a:p>
         </p:txBody>
       </p:sp>
@@ -4249,10 +4350,9 @@
           <a:lstStyle/>
           <a:p>
             <a:r>
-              <a:rPr lang="en-US" sz="1000" smtClean="0"/>
+              <a:rPr lang="en-US" sz="1000"/>
               <a:t>NPS WRST Caribou database</a:t>
             </a:r>
-            <a:endParaRPr lang="en-US" sz="1000"/>
           </a:p>
         </p:txBody>
       </p:sp>
@@ -4286,10 +4386,9 @@
           <a:lstStyle/>
           <a:p>
             <a:r>
-              <a:rPr lang="en-US" smtClean="0"/>
+              <a:rPr lang="en-US"/>
               <a:t>AnimalID</a:t>
             </a:r>
-            <a:endParaRPr lang="en-US"/>
           </a:p>
         </p:txBody>
       </p:sp>
@@ -4426,10 +4525,9 @@
           <a:lstStyle/>
           <a:p>
             <a:r>
-              <a:rPr lang="en-US" smtClean="0"/>
+              <a:rPr lang="en-US"/>
               <a:t>Chisana PE Survey</a:t>
             </a:r>
-            <a:endParaRPr lang="en-US"/>
           </a:p>
         </p:txBody>
       </p:sp>
@@ -4456,20 +4554,15 @@
           <a:lstStyle/>
           <a:p>
             <a:r>
-              <a:rPr lang="en-US" sz="1200" smtClean="0"/>
+              <a:rPr lang="en-US" sz="1200"/>
               <a:t>1. Survey area delineated by locating all radio collared animals</a:t>
             </a:r>
           </a:p>
           <a:p>
             <a:r>
-              <a:rPr lang="en-US" sz="1200" smtClean="0"/>
-              <a:t>2. Search for caribou groups without radiolocating. </a:t>
-            </a:r>
-            <a:r>
               <a:rPr lang="en-US" sz="1200"/>
-              <a:t>Simultaneously, a fixed-wing aircraft locates radiocollared caribou to determine their locations and group sizes </a:t>
-            </a:r>
-            <a:endParaRPr lang="en-US" sz="1200" smtClean="0"/>
+              <a:t>2. Search for caribou groups without radiolocating. Simultaneously, a fixed-wing aircraft locates radiocollared caribou to determine their locations and group sizes </a:t>
+            </a:r>
           </a:p>
           <a:p>
             <a:endParaRPr lang="en-US" sz="1200"/>

</xml_diff>